<commit_message>
Update testing program. Add slides of my recent talk on Mar 07.
</commit_message>
<xml_diff>
--- a/reports/Jan30/Studies of TDMI Analysis based on Simulation of IF Neurons.pptx
+++ b/reports/Jan30/Studies of TDMI Analysis based on Simulation of IF Neurons.pptx
@@ -135,10 +135,6 @@
 </p:presentation>
 </file>
 
-<file path=ppt/revisionInfo.xml><?xml version="1.0" encoding="utf-8"?>
-<p1510:revInfo xmlns:a="http://schemas.openxmlformats.org/drawingml/2006/main" xmlns:r="http://schemas.openxmlformats.org/officeDocument/2006/relationships" xmlns:p1510="http://schemas.microsoft.com/office/powerpoint/2015/10/main"/>
-</file>
-
 <file path=ppt/slideLayouts/slideLayout1.xml><?xml version="1.0" encoding="utf-8"?>
 <p:sldLayout xmlns:a="http://schemas.openxmlformats.org/drawingml/2006/main" xmlns:r="http://schemas.openxmlformats.org/officeDocument/2006/relationships" xmlns:p="http://schemas.openxmlformats.org/presentationml/2006/main" type="title" preserve="1">
   <p:cSld name="Title Slide">
@@ -287,7 +283,7 @@
             <a:fld id="{08B9EBBA-996F-894A-B54A-D6246ED52CEA}" type="datetimeFigureOut">
               <a:rPr lang="en-US" smtClean="0"/>
               <a:pPr/>
-              <a:t>2/1/2018</a:t>
+              <a:t>3/5/2018</a:t>
             </a:fld>
             <a:endParaRPr lang="en-US" dirty="0"/>
           </a:p>
@@ -487,7 +483,7 @@
             <a:fld id="{C6C52C72-DE31-F449-A4ED-4C594FD91407}" type="datetimeFigureOut">
               <a:rPr lang="en-US" smtClean="0"/>
               <a:pPr/>
-              <a:t>2/1/2018</a:t>
+              <a:t>3/5/2018</a:t>
             </a:fld>
             <a:endParaRPr lang="en-US" dirty="0"/>
           </a:p>
@@ -697,7 +693,7 @@
             <a:fld id="{ED62726E-379B-B349-9EED-81ED093FA806}" type="datetimeFigureOut">
               <a:rPr lang="en-US" smtClean="0"/>
               <a:pPr/>
-              <a:t>2/1/2018</a:t>
+              <a:t>3/5/2018</a:t>
             </a:fld>
             <a:endParaRPr lang="en-US" dirty="0"/>
           </a:p>
@@ -897,7 +893,7 @@
             <a:fld id="{9B3A1323-8D79-1946-B0D7-40001CF92E9D}" type="datetimeFigureOut">
               <a:rPr lang="en-US" smtClean="0"/>
               <a:pPr/>
-              <a:t>2/1/2018</a:t>
+              <a:t>3/5/2018</a:t>
             </a:fld>
             <a:endParaRPr lang="en-US" dirty="0"/>
           </a:p>
@@ -1174,7 +1170,7 @@
             <a:fld id="{8DFA1846-DA80-1C48-A609-854EA85C59AD}" type="datetimeFigureOut">
               <a:rPr lang="en-US" smtClean="0"/>
               <a:pPr/>
-              <a:t>2/1/2018</a:t>
+              <a:t>3/5/2018</a:t>
             </a:fld>
             <a:endParaRPr lang="en-US" dirty="0"/>
           </a:p>
@@ -1441,7 +1437,7 @@
             <a:fld id="{57302355-E14B-8545-A8F8-0FE83CC9D524}" type="datetimeFigureOut">
               <a:rPr lang="en-US" smtClean="0"/>
               <a:pPr/>
-              <a:t>2/1/2018</a:t>
+              <a:t>3/5/2018</a:t>
             </a:fld>
             <a:endParaRPr lang="en-US" dirty="0"/>
           </a:p>
@@ -1855,7 +1851,7 @@
             <a:fld id="{02640F58-564D-2B4F-AE67-E407BA4FCF45}" type="datetimeFigureOut">
               <a:rPr lang="en-US" smtClean="0"/>
               <a:pPr/>
-              <a:t>2/1/2018</a:t>
+              <a:t>3/5/2018</a:t>
             </a:fld>
             <a:endParaRPr lang="en-US" dirty="0"/>
           </a:p>
@@ -1998,7 +1994,7 @@
             <a:fld id="{F13A34C8-038E-2045-AF43-DF7DBB8E0E9E}" type="datetimeFigureOut">
               <a:rPr lang="en-US" smtClean="0"/>
               <a:pPr/>
-              <a:t>2/1/2018</a:t>
+              <a:t>3/5/2018</a:t>
             </a:fld>
             <a:endParaRPr lang="en-US" dirty="0"/>
           </a:p>
@@ -2113,7 +2109,7 @@
             <a:fld id="{8818C68F-D26B-8F47-958C-23B49CF8A634}" type="datetimeFigureOut">
               <a:rPr lang="en-US" smtClean="0"/>
               <a:pPr/>
-              <a:t>2/1/2018</a:t>
+              <a:t>3/5/2018</a:t>
             </a:fld>
             <a:endParaRPr lang="en-US" dirty="0"/>
           </a:p>
@@ -2426,7 +2422,7 @@
             <a:fld id="{D0DF5E60-9974-AC48-9591-99C2BB44B7CF}" type="datetimeFigureOut">
               <a:rPr lang="en-US" smtClean="0"/>
               <a:pPr/>
-              <a:t>2/1/2018</a:t>
+              <a:t>3/5/2018</a:t>
             </a:fld>
             <a:endParaRPr lang="en-US" dirty="0"/>
           </a:p>
@@ -2716,7 +2712,7 @@
             <a:fld id="{18C79C5D-2A6F-F04D-97DA-BEF2467B64E4}" type="datetimeFigureOut">
               <a:rPr lang="en-US" smtClean="0"/>
               <a:pPr/>
-              <a:t>2/1/2018</a:t>
+              <a:t>3/5/2018</a:t>
             </a:fld>
             <a:endParaRPr lang="en-US" dirty="0"/>
           </a:p>
@@ -2959,7 +2955,7 @@
             <a:fld id="{09B482E8-6E0E-1B4F-B1FD-C69DB9E858D9}" type="datetimeFigureOut">
               <a:rPr lang="en-US" smtClean="0"/>
               <a:pPr/>
-              <a:t>2/1/2018</a:t>
+              <a:t>3/5/2018</a:t>
             </a:fld>
             <a:endParaRPr lang="en-US" dirty="0"/>
           </a:p>

</xml_diff>